<commit_message>
Update to Refinement Intro & QAG
Updated files after reorg
</commit_message>
<xml_diff>
--- a/training/English (en)/Refinement and Publication Training [R&P]/01 Intro to Refinement WT and Slides/Refinement Workshop Intro WT slides.pptx
+++ b/training/English (en)/Refinement and Publication Training [R&P]/01 Intro to Refinement WT and Slides/Refinement Workshop Intro WT slides.pptx
@@ -5,7 +5,7 @@
     <p:sldMasterId id="2147483660" r:id="rId4"/>
   </p:sldMasterIdLst>
   <p:notesMasterIdLst>
-    <p:notesMasterId r:id="rId14"/>
+    <p:notesMasterId r:id="rId13"/>
   </p:notesMasterIdLst>
   <p:sldIdLst>
     <p:sldId id="282" r:id="rId5"/>
@@ -14,9 +14,8 @@
     <p:sldId id="331" r:id="rId8"/>
     <p:sldId id="287" r:id="rId9"/>
     <p:sldId id="258" r:id="rId10"/>
-    <p:sldId id="339" r:id="rId11"/>
-    <p:sldId id="338" r:id="rId12"/>
-    <p:sldId id="280" r:id="rId13"/>
+    <p:sldId id="340" r:id="rId11"/>
+    <p:sldId id="280" r:id="rId12"/>
   </p:sldIdLst>
   <p:sldSz cx="9144000" cy="6858000" type="screen4x3"/>
   <p:notesSz cx="6858000" cy="9144000"/>
@@ -236,7 +235,7 @@
           <a:p>
             <a:fld id="{AC6AA070-92F4-A447-BB88-F5E94FF9CF8B}" type="datetimeFigureOut">
               <a:rPr lang="en-US" smtClean="0"/>
-              <a:t>12/16/24</a:t>
+              <a:t>10/23/25</a:t>
             </a:fld>
             <a:endParaRPr lang="en-US"/>
           </a:p>
@@ -547,6 +546,93 @@
           <a:bodyPr/>
           <a:lstStyle/>
           <a:p>
+            <a:r>
+              <a:rPr lang="en-US"/>
+              <a:t>04/2025</a:t>
+            </a:r>
+          </a:p>
+        </p:txBody>
+      </p:sp>
+      <p:sp>
+        <p:nvSpPr>
+          <p:cNvPr id="4" name="Slide Number Placeholder 3"/>
+          <p:cNvSpPr>
+            <a:spLocks noGrp="1"/>
+          </p:cNvSpPr>
+          <p:nvPr>
+            <p:ph type="sldNum" sz="quarter" idx="5"/>
+          </p:nvPr>
+        </p:nvSpPr>
+        <p:spPr/>
+        <p:txBody>
+          <a:bodyPr/>
+          <a:lstStyle/>
+          <a:p>
+            <a:fld id="{9939B3C9-13A9-6540-8F68-9A544DD081BF}" type="slidenum">
+              <a:rPr lang="en-US" smtClean="0"/>
+              <a:t>1</a:t>
+            </a:fld>
+            <a:endParaRPr lang="en-US"/>
+          </a:p>
+        </p:txBody>
+      </p:sp>
+    </p:spTree>
+    <p:extLst>
+      <p:ext uri="{BB962C8B-B14F-4D97-AF65-F5344CB8AC3E}">
+        <p14:creationId xmlns:p14="http://schemas.microsoft.com/office/powerpoint/2010/main" val="2378763216"/>
+      </p:ext>
+    </p:extLst>
+  </p:cSld>
+  <p:clrMapOvr>
+    <a:masterClrMapping/>
+  </p:clrMapOvr>
+</p:notes>
+</file>
+
+<file path=ppt/notesSlides/notesSlide2.xml><?xml version="1.0" encoding="utf-8"?>
+<p:notes xmlns:a="http://schemas.openxmlformats.org/drawingml/2006/main" xmlns:r="http://schemas.openxmlformats.org/officeDocument/2006/relationships" xmlns:p="http://schemas.openxmlformats.org/presentationml/2006/main">
+  <p:cSld>
+    <p:spTree>
+      <p:nvGrpSpPr>
+        <p:cNvPr id="1" name=""/>
+        <p:cNvGrpSpPr/>
+        <p:nvPr/>
+      </p:nvGrpSpPr>
+      <p:grpSpPr>
+        <a:xfrm>
+          <a:off x="0" y="0"/>
+          <a:ext cx="0" cy="0"/>
+          <a:chOff x="0" y="0"/>
+          <a:chExt cx="0" cy="0"/>
+        </a:xfrm>
+      </p:grpSpPr>
+      <p:sp>
+        <p:nvSpPr>
+          <p:cNvPr id="2" name="Slide Image Placeholder 1"/>
+          <p:cNvSpPr>
+            <a:spLocks noGrp="1" noRot="1" noChangeAspect="1"/>
+          </p:cNvSpPr>
+          <p:nvPr>
+            <p:ph type="sldImg"/>
+          </p:nvPr>
+        </p:nvSpPr>
+        <p:spPr/>
+      </p:sp>
+      <p:sp>
+        <p:nvSpPr>
+          <p:cNvPr id="3" name="Notes Placeholder 2"/>
+          <p:cNvSpPr>
+            <a:spLocks noGrp="1"/>
+          </p:cNvSpPr>
+          <p:nvPr>
+            <p:ph type="body" idx="1"/>
+          </p:nvPr>
+        </p:nvSpPr>
+        <p:spPr/>
+        <p:txBody>
+          <a:bodyPr/>
+          <a:lstStyle/>
+          <a:p>
             <a:endParaRPr lang="en-US"/>
           </a:p>
         </p:txBody>
@@ -587,7 +673,7 @@
 </p:notes>
 </file>
 
-<file path=ppt/notesSlides/notesSlide2.xml><?xml version="1.0" encoding="utf-8"?>
+<file path=ppt/notesSlides/notesSlide3.xml><?xml version="1.0" encoding="utf-8"?>
 <p:notes xmlns:a="http://schemas.openxmlformats.org/drawingml/2006/main" xmlns:r="http://schemas.openxmlformats.org/officeDocument/2006/relationships" xmlns:p="http://schemas.openxmlformats.org/presentationml/2006/main">
   <p:cSld>
     <p:spTree>
@@ -671,7 +757,7 @@
 </p:notes>
 </file>
 
-<file path=ppt/notesSlides/notesSlide3.xml><?xml version="1.0" encoding="utf-8"?>
+<file path=ppt/notesSlides/notesSlide4.xml><?xml version="1.0" encoding="utf-8"?>
 <p:notes xmlns:a="http://schemas.openxmlformats.org/drawingml/2006/main" xmlns:r="http://schemas.openxmlformats.org/officeDocument/2006/relationships" xmlns:p="http://schemas.openxmlformats.org/presentationml/2006/main">
   <p:cSld>
     <p:spTree>
@@ -736,7 +822,7 @@
           <a:p>
             <a:fld id="{9939B3C9-13A9-6540-8F68-9A544DD081BF}" type="slidenum">
               <a:rPr lang="en-US" smtClean="0"/>
-              <a:t>9</a:t>
+              <a:t>8</a:t>
             </a:fld>
             <a:endParaRPr lang="en-US"/>
           </a:p>
@@ -892,7 +978,7 @@
           <a:p>
             <a:fld id="{2D176C0A-5C67-429D-B78E-C0F7FE360763}" type="datetimeFigureOut">
               <a:rPr lang="en-US" smtClean="0"/>
-              <a:t>12/16/24</a:t>
+              <a:t>10/23/25</a:t>
             </a:fld>
             <a:endParaRPr lang="en-US"/>
           </a:p>
@@ -2757,7 +2843,7 @@
           <p:nvPr/>
         </p:nvPicPr>
         <p:blipFill>
-          <a:blip r:embed="rId2">
+          <a:blip r:embed="rId3">
             <a:extLst>
               <a:ext uri="{28A0092B-C50C-407E-A947-70E740481C1C}">
                 <a14:useLocalDpi xmlns:a14="http://schemas.microsoft.com/office/drawing/2010/main" val="0"/>
@@ -2982,9 +3068,14 @@
           <a:lstStyle/>
           <a:p>
             <a:r>
+              <a:rPr lang="en-US" dirty="0"/>
+              <a:t>Activities to </a:t>
+            </a:r>
+            <a:r>
               <a:rPr lang="en-US"/>
-              <a:t>Activities to Ensure Accuracy</a:t>
+              <a:t>Ensure Quality</a:t>
             </a:r>
+            <a:endParaRPr lang="en-US" dirty="0"/>
           </a:p>
         </p:txBody>
       </p:sp>
@@ -3065,21 +3156,21 @@
               <a:buChar char="•"/>
             </a:pPr>
             <a:r>
-              <a:rPr lang="en-US" sz="2600" b="1">
+              <a:rPr lang="en-US" sz="2600" b="1" dirty="0">
                 <a:solidFill>
                   <a:schemeClr val="accent2"/>
                 </a:solidFill>
               </a:rPr>
-              <a:t>MAST Checking Steps (Step 7: Key Word Check)</a:t>
+              <a:t>Checking Steps</a:t>
             </a:r>
             <a:br>
-              <a:rPr lang="en-US" sz="2600" b="1">
+              <a:rPr lang="en-US" sz="2600" b="1" dirty="0">
                 <a:solidFill>
                   <a:schemeClr val="accent2"/>
                 </a:solidFill>
               </a:rPr>
             </a:br>
-            <a:endParaRPr lang="en-US" sz="2600" b="1">
+            <a:endParaRPr lang="en-US" sz="2600" b="1" dirty="0">
               <a:solidFill>
                 <a:schemeClr val="accent2"/>
               </a:solidFill>
@@ -3091,7 +3182,7 @@
               <a:buChar char="•"/>
             </a:pPr>
             <a:r>
-              <a:rPr lang="en-US" sz="2600" b="1">
+              <a:rPr lang="en-US" sz="2600" b="1" dirty="0">
                 <a:solidFill>
                   <a:schemeClr val="accent2"/>
                 </a:solidFill>
@@ -3099,13 +3190,13 @@
               <a:t>Quality Assessment Guide</a:t>
             </a:r>
             <a:br>
-              <a:rPr lang="en-US" sz="2600" b="1">
+              <a:rPr lang="en-US" sz="2600" b="1" dirty="0">
                 <a:solidFill>
                   <a:schemeClr val="accent2"/>
                 </a:solidFill>
               </a:rPr>
             </a:br>
-            <a:endParaRPr lang="en-US" sz="2600" b="1">
+            <a:endParaRPr lang="en-US" sz="2600" b="1" dirty="0">
               <a:solidFill>
                 <a:schemeClr val="accent2"/>
               </a:solidFill>
@@ -3117,7 +3208,7 @@
               <a:buChar char="•"/>
             </a:pPr>
             <a:r>
-              <a:rPr lang="en-US" sz="2600" b="1">
+              <a:rPr lang="en-US" sz="2600" b="1" dirty="0">
                 <a:solidFill>
                   <a:schemeClr val="accent2"/>
                 </a:solidFill>
@@ -3130,7 +3221,7 @@
               <a:buFont typeface="Arial" panose="020B0604020202020204" pitchFamily="34" charset="0"/>
               <a:buChar char="•"/>
             </a:pPr>
-            <a:endParaRPr lang="en-US" sz="2600" b="1">
+            <a:endParaRPr lang="en-US" sz="2600" b="1" dirty="0">
               <a:solidFill>
                 <a:schemeClr val="accent2"/>
               </a:solidFill>
@@ -3142,7 +3233,7 @@
               <a:buChar char="•"/>
             </a:pPr>
             <a:r>
-              <a:rPr lang="en-US" sz="2600" b="1">
+              <a:rPr lang="en-US" sz="2600" b="1" dirty="0">
                 <a:solidFill>
                   <a:schemeClr val="accent2"/>
                 </a:solidFill>
@@ -3150,13 +3241,13 @@
               <a:t>Spiritual Terms Evaluation</a:t>
             </a:r>
             <a:br>
-              <a:rPr lang="en-US" sz="2600" b="1">
+              <a:rPr lang="en-US" sz="2600" b="1" dirty="0">
                 <a:solidFill>
                   <a:schemeClr val="accent2"/>
                 </a:solidFill>
               </a:rPr>
             </a:br>
-            <a:endParaRPr lang="en-US" sz="2600" b="1">
+            <a:endParaRPr lang="en-US" sz="2600" b="1" dirty="0">
               <a:solidFill>
                 <a:schemeClr val="accent2"/>
               </a:solidFill>
@@ -3168,7 +3259,7 @@
               <a:buChar char="•"/>
             </a:pPr>
             <a:r>
-              <a:rPr lang="en-US" sz="2600" b="1">
+              <a:rPr lang="en-US" sz="2600" b="1" dirty="0">
                 <a:solidFill>
                   <a:schemeClr val="accent2"/>
                 </a:solidFill>
@@ -3181,7 +3272,7 @@
               <a:buFont typeface="Arial" panose="020B0604020202020204" pitchFamily="34" charset="0"/>
               <a:buChar char="•"/>
             </a:pPr>
-            <a:endParaRPr lang="en-US" sz="2800" b="1">
+            <a:endParaRPr lang="en-US" sz="2800" b="1" dirty="0">
               <a:solidFill>
                 <a:schemeClr val="accent2"/>
               </a:solidFill>
@@ -3991,14 +4082,14 @@
           <a:p>
             <a:pPr algn="ctr"/>
             <a:r>
-              <a:rPr lang="en-US" sz="3000" b="1">
+              <a:rPr lang="en-US" sz="3000" b="1" dirty="0">
                 <a:solidFill>
                   <a:schemeClr val="bg1"/>
                 </a:solidFill>
               </a:rPr>
-              <a:t>MAST steps</a:t>
+              <a:t>The 8 Steps</a:t>
             </a:r>
-            <a:endParaRPr lang="en-US" sz="3000">
+            <a:endParaRPr lang="en-US" sz="3000" dirty="0">
               <a:solidFill>
                 <a:schemeClr val="bg1"/>
               </a:solidFill>
@@ -4263,12 +4354,12 @@
               </a:spcBef>
             </a:pPr>
             <a:r>
-              <a:rPr lang="en-US" sz="2000" b="1">
+              <a:rPr lang="en-US" sz="2000" b="1" dirty="0">
                 <a:solidFill>
                   <a:srgbClr val="005595"/>
                 </a:solidFill>
               </a:rPr>
-              <a:t>1. Key Word Check					Translators</a:t>
+              <a:t>1. Checking Steps						Translators</a:t>
             </a:r>
           </a:p>
           <a:p>
@@ -4278,7 +4369,7 @@
               </a:spcBef>
             </a:pPr>
             <a:r>
-              <a:rPr lang="en-US" sz="2000" b="1">
+              <a:rPr lang="en-US" sz="2000" b="1" dirty="0">
                 <a:solidFill>
                   <a:srgbClr val="005595"/>
                 </a:solidFill>
@@ -4293,7 +4384,7 @@
               </a:spcBef>
             </a:pPr>
             <a:r>
-              <a:rPr lang="en-US" sz="2000" b="1">
+              <a:rPr lang="en-US" sz="2000" b="1" dirty="0">
                 <a:solidFill>
                   <a:srgbClr val="005595"/>
                 </a:solidFill>
@@ -4301,7 +4392,7 @@
               <a:t>3. </a:t>
             </a:r>
             <a:r>
-              <a:rPr lang="en-US" sz="2000" b="1">
+              <a:rPr lang="en-US" sz="2000" b="1" dirty="0">
                 <a:solidFill>
                   <a:schemeClr val="accent6">
                     <a:lumMod val="50000"/>
@@ -4311,14 +4402,14 @@
               <a:t>Reviewers’ Guide					Believers who were not translators</a:t>
             </a:r>
             <a:br>
-              <a:rPr lang="en-US" sz="2000" b="1">
+              <a:rPr lang="en-US" sz="2000" b="1" dirty="0">
                 <a:solidFill>
                   <a:srgbClr val="005595"/>
                 </a:solidFill>
               </a:rPr>
             </a:br>
             <a:r>
-              <a:rPr lang="en-US" sz="2000" b="1">
+              <a:rPr lang="en-US" sz="2000" b="1" dirty="0">
                 <a:solidFill>
                   <a:srgbClr val="005595"/>
                 </a:solidFill>
@@ -4333,7 +4424,7 @@
               </a:spcBef>
             </a:pPr>
             <a:r>
-              <a:rPr lang="en-US" sz="2000" b="1">
+              <a:rPr lang="en-US" sz="2000" b="1" dirty="0">
                 <a:solidFill>
                   <a:srgbClr val="005595"/>
                 </a:solidFill>
@@ -4341,7 +4432,7 @@
               <a:t>4. Spiritual Terms Evaluation tool		Translators, with </a:t>
             </a:r>
             <a:r>
-              <a:rPr lang="en-US" sz="2000" b="1"/>
+              <a:rPr lang="en-US" sz="2000" b="1" dirty="0"/>
               <a:t>spiritual leaders</a:t>
             </a:r>
           </a:p>
@@ -4352,7 +4443,7 @@
               </a:spcBef>
             </a:pPr>
             <a:r>
-              <a:rPr lang="en-US" sz="2000" b="1">
+              <a:rPr lang="en-US" sz="2000" b="1" dirty="0">
                 <a:solidFill>
                   <a:srgbClr val="005595"/>
                 </a:solidFill>
@@ -5504,13 +5595,7 @@
   <p:cSld>
     <p:spTree>
       <p:nvGrpSpPr>
-        <p:cNvPr id="1" name="">
-          <a:extLst>
-            <a:ext uri="{FF2B5EF4-FFF2-40B4-BE49-F238E27FC236}">
-              <a16:creationId xmlns:a16="http://schemas.microsoft.com/office/drawing/2014/main" id="{983389B3-0B2E-CD18-5A9D-62FF1B0066F4}"/>
-            </a:ext>
-          </a:extLst>
-        </p:cNvPr>
+        <p:cNvPr id="1" name=""/>
         <p:cNvGrpSpPr/>
         <p:nvPr/>
       </p:nvGrpSpPr>
@@ -5522,66 +5607,59 @@
           <a:chExt cx="0" cy="0"/>
         </a:xfrm>
       </p:grpSpPr>
-      <p:sp>
-        <p:nvSpPr>
-          <p:cNvPr id="2" name="Rectangle 1">
+      <p:pic>
+        <p:nvPicPr>
+          <p:cNvPr id="1026" name="Picture 2">
             <a:extLst>
               <a:ext uri="{FF2B5EF4-FFF2-40B4-BE49-F238E27FC236}">
-                <a16:creationId xmlns:a16="http://schemas.microsoft.com/office/drawing/2014/main" id="{BDA07B8B-6E97-87F1-656A-49E5D007B926}"/>
+                <a16:creationId xmlns:a16="http://schemas.microsoft.com/office/drawing/2014/main" id="{55AE9C35-A387-5394-28A4-6237975BD5E5}"/>
               </a:ext>
             </a:extLst>
           </p:cNvPr>
-          <p:cNvSpPr/>
+          <p:cNvPicPr>
+            <a:picLocks noChangeAspect="1" noChangeArrowheads="1"/>
+          </p:cNvPicPr>
           <p:nvPr/>
-        </p:nvSpPr>
-        <p:spPr>
+        </p:nvPicPr>
+        <p:blipFill>
+          <a:blip r:embed="rId2">
+            <a:extLst>
+              <a:ext uri="{28A0092B-C50C-407E-A947-70E740481C1C}">
+                <a14:useLocalDpi xmlns:a14="http://schemas.microsoft.com/office/drawing/2010/main" val="0"/>
+              </a:ext>
+            </a:extLst>
+          </a:blip>
+          <a:srcRect/>
+          <a:stretch>
+            <a:fillRect/>
+          </a:stretch>
+        </p:blipFill>
+        <p:spPr bwMode="auto">
           <a:xfrm>
-            <a:off x="908334" y="2563237"/>
-            <a:ext cx="7238185" cy="960120"/>
+            <a:off x="0" y="1971675"/>
+            <a:ext cx="9144000" cy="2914650"/>
           </a:xfrm>
           <a:prstGeom prst="rect">
             <a:avLst/>
           </a:prstGeom>
-          <a:solidFill>
-            <a:srgbClr val="F3CB4A"/>
-          </a:solidFill>
-          <a:ln w="3175">
-            <a:solidFill>
-              <a:schemeClr val="tx1"/>
-            </a:solidFill>
-          </a:ln>
+          <a:noFill/>
+          <a:extLst>
+            <a:ext uri="{909E8E84-426E-40DD-AFC4-6F175D3DCCD1}">
+              <a14:hiddenFill xmlns:a14="http://schemas.microsoft.com/office/drawing/2010/main">
+                <a:solidFill>
+                  <a:srgbClr val="FFFFFF"/>
+                </a:solidFill>
+              </a14:hiddenFill>
+            </a:ext>
+          </a:extLst>
         </p:spPr>
-        <p:style>
-          <a:lnRef idx="2">
-            <a:schemeClr val="accent1">
-              <a:shade val="15000"/>
-            </a:schemeClr>
-          </a:lnRef>
-          <a:fillRef idx="1">
-            <a:schemeClr val="accent1"/>
-          </a:fillRef>
-          <a:effectRef idx="0">
-            <a:schemeClr val="accent1"/>
-          </a:effectRef>
-          <a:fontRef idx="minor">
-            <a:schemeClr val="lt1"/>
-          </a:fontRef>
-        </p:style>
-        <p:txBody>
-          <a:bodyPr rtlCol="0" anchor="ctr"/>
-          <a:lstStyle/>
-          <a:p>
-            <a:pPr algn="ctr"/>
-            <a:endParaRPr lang="en-US" sz="1350"/>
-          </a:p>
-        </p:txBody>
-      </p:sp>
+      </p:pic>
       <p:sp>
         <p:nvSpPr>
-          <p:cNvPr id="3" name="TextBox 2">
+          <p:cNvPr id="4" name="TextBox 3">
             <a:extLst>
               <a:ext uri="{FF2B5EF4-FFF2-40B4-BE49-F238E27FC236}">
-                <a16:creationId xmlns:a16="http://schemas.microsoft.com/office/drawing/2014/main" id="{D43A8E60-AB96-3725-3B94-E0E2744B4F2B}"/>
+                <a16:creationId xmlns:a16="http://schemas.microsoft.com/office/drawing/2014/main" id="{78695F6F-9920-4E32-98BA-2F12D44A52E6}"/>
               </a:ext>
             </a:extLst>
           </p:cNvPr>
@@ -5590,99 +5668,8 @@
         </p:nvSpPr>
         <p:spPr>
           <a:xfrm>
-            <a:off x="108486" y="2892109"/>
-            <a:ext cx="895601" cy="415498"/>
-          </a:xfrm>
-          <a:prstGeom prst="rect">
-            <a:avLst/>
-          </a:prstGeom>
-          <a:noFill/>
-        </p:spPr>
-        <p:txBody>
-          <a:bodyPr wrap="square" rtlCol="0">
-            <a:spAutoFit/>
-          </a:bodyPr>
-          <a:lstStyle/>
-          <a:p>
-            <a:r>
-              <a:rPr lang="en-US" sz="2100" b="1"/>
-              <a:t>Train</a:t>
-            </a:r>
-          </a:p>
-        </p:txBody>
-      </p:sp>
-      <p:sp>
-        <p:nvSpPr>
-          <p:cNvPr id="5" name="Rectangle 4">
-            <a:extLst>
-              <a:ext uri="{FF2B5EF4-FFF2-40B4-BE49-F238E27FC236}">
-                <a16:creationId xmlns:a16="http://schemas.microsoft.com/office/drawing/2014/main" id="{58450446-A5AE-2DF5-0B53-D0E9AD367358}"/>
-              </a:ext>
-            </a:extLst>
-          </p:cNvPr>
-          <p:cNvSpPr/>
-          <p:nvPr/>
-        </p:nvSpPr>
-        <p:spPr>
-          <a:xfrm>
-            <a:off x="1009504" y="2563237"/>
-            <a:ext cx="4350845" cy="960120"/>
-          </a:xfrm>
-          <a:prstGeom prst="rect">
-            <a:avLst/>
-          </a:prstGeom>
-          <a:solidFill>
-            <a:schemeClr val="accent2"/>
-          </a:solidFill>
-          <a:ln>
-            <a:noFill/>
-          </a:ln>
-        </p:spPr>
-        <p:style>
-          <a:lnRef idx="2">
-            <a:schemeClr val="accent1">
-              <a:shade val="15000"/>
-            </a:schemeClr>
-          </a:lnRef>
-          <a:fillRef idx="1">
-            <a:schemeClr val="accent1"/>
-          </a:fillRef>
-          <a:effectRef idx="0">
-            <a:schemeClr val="accent1"/>
-          </a:effectRef>
-          <a:fontRef idx="minor">
-            <a:schemeClr val="lt1"/>
-          </a:fontRef>
-        </p:style>
-        <p:txBody>
-          <a:bodyPr rtlCol="0" anchor="ctr"/>
-          <a:lstStyle/>
-          <a:p>
-            <a:pPr algn="ctr"/>
-            <a:endParaRPr lang="en-US" sz="1350">
-              <a:solidFill>
-                <a:schemeClr val="tx1"/>
-              </a:solidFill>
-            </a:endParaRPr>
-          </a:p>
-        </p:txBody>
-      </p:sp>
-      <p:sp>
-        <p:nvSpPr>
-          <p:cNvPr id="4" name="TextBox 3">
-            <a:extLst>
-              <a:ext uri="{FF2B5EF4-FFF2-40B4-BE49-F238E27FC236}">
-                <a16:creationId xmlns:a16="http://schemas.microsoft.com/office/drawing/2014/main" id="{8136F446-E747-B759-A3A7-3774270FEFDA}"/>
-              </a:ext>
-            </a:extLst>
-          </p:cNvPr>
-          <p:cNvSpPr txBox="1"/>
-          <p:nvPr/>
-        </p:nvSpPr>
-        <p:spPr>
-          <a:xfrm>
-            <a:off x="2068509" y="2803394"/>
-            <a:ext cx="2473013" cy="553998"/>
+            <a:off x="633845" y="737755"/>
+            <a:ext cx="7481455" cy="584775"/>
           </a:xfrm>
           <a:prstGeom prst="rect">
             <a:avLst/>
@@ -5697,147 +5684,12 @@
           <a:p>
             <a:pPr algn="ctr"/>
             <a:r>
-              <a:rPr lang="en-US" sz="3000" b="1">
+              <a:rPr lang="en-US" sz="3200" b="1" dirty="0">
                 <a:solidFill>
-                  <a:schemeClr val="bg1"/>
+                  <a:srgbClr val="B95659"/>
                 </a:solidFill>
               </a:rPr>
-              <a:t>MAST steps</a:t>
-            </a:r>
-            <a:endParaRPr lang="en-US" sz="3000">
-              <a:solidFill>
-                <a:schemeClr val="bg1"/>
-              </a:solidFill>
-            </a:endParaRPr>
-          </a:p>
-        </p:txBody>
-      </p:sp>
-      <p:sp>
-        <p:nvSpPr>
-          <p:cNvPr id="6" name="Rectangle 5">
-            <a:extLst>
-              <a:ext uri="{FF2B5EF4-FFF2-40B4-BE49-F238E27FC236}">
-                <a16:creationId xmlns:a16="http://schemas.microsoft.com/office/drawing/2014/main" id="{AD854247-931C-6D12-38B5-078C76A12A16}"/>
-              </a:ext>
-            </a:extLst>
-          </p:cNvPr>
-          <p:cNvSpPr/>
-          <p:nvPr/>
-        </p:nvSpPr>
-        <p:spPr>
-          <a:xfrm>
-            <a:off x="5337196" y="2563999"/>
-            <a:ext cx="2504969" cy="960120"/>
-          </a:xfrm>
-          <a:prstGeom prst="rect">
-            <a:avLst/>
-          </a:prstGeom>
-          <a:solidFill>
-            <a:schemeClr val="accent1"/>
-          </a:solidFill>
-          <a:ln>
-            <a:solidFill>
-              <a:schemeClr val="accent1"/>
-            </a:solidFill>
-          </a:ln>
-        </p:spPr>
-        <p:style>
-          <a:lnRef idx="2">
-            <a:schemeClr val="accent1">
-              <a:shade val="15000"/>
-            </a:schemeClr>
-          </a:lnRef>
-          <a:fillRef idx="1">
-            <a:schemeClr val="accent1"/>
-          </a:fillRef>
-          <a:effectRef idx="0">
-            <a:schemeClr val="accent1"/>
-          </a:effectRef>
-          <a:fontRef idx="minor">
-            <a:schemeClr val="lt1"/>
-          </a:fontRef>
-        </p:style>
-        <p:txBody>
-          <a:bodyPr rtlCol="0" anchor="ctr"/>
-          <a:lstStyle/>
-          <a:p>
-            <a:pPr algn="ctr"/>
-            <a:endParaRPr lang="en-US" sz="1350"/>
-          </a:p>
-        </p:txBody>
-      </p:sp>
-      <p:sp>
-        <p:nvSpPr>
-          <p:cNvPr id="7" name="TextBox 6">
-            <a:extLst>
-              <a:ext uri="{FF2B5EF4-FFF2-40B4-BE49-F238E27FC236}">
-                <a16:creationId xmlns:a16="http://schemas.microsoft.com/office/drawing/2014/main" id="{66A1A065-AF26-D01C-D7B4-EB2263295120}"/>
-              </a:ext>
-            </a:extLst>
-          </p:cNvPr>
-          <p:cNvSpPr txBox="1"/>
-          <p:nvPr/>
-        </p:nvSpPr>
-        <p:spPr>
-          <a:xfrm>
-            <a:off x="5337196" y="2798164"/>
-            <a:ext cx="2504969" cy="553998"/>
-          </a:xfrm>
-          <a:prstGeom prst="rect">
-            <a:avLst/>
-          </a:prstGeom>
-          <a:noFill/>
-        </p:spPr>
-        <p:txBody>
-          <a:bodyPr wrap="square" rtlCol="0">
-            <a:spAutoFit/>
-          </a:bodyPr>
-          <a:lstStyle/>
-          <a:p>
-            <a:pPr algn="ctr"/>
-            <a:r>
-              <a:rPr lang="en-US" sz="3000" b="1">
-                <a:solidFill>
-                  <a:schemeClr val="bg1"/>
-                </a:solidFill>
-              </a:rPr>
-              <a:t>Refinement</a:t>
-            </a:r>
-          </a:p>
-        </p:txBody>
-      </p:sp>
-      <p:sp>
-        <p:nvSpPr>
-          <p:cNvPr id="22" name="TextBox 21">
-            <a:extLst>
-              <a:ext uri="{FF2B5EF4-FFF2-40B4-BE49-F238E27FC236}">
-                <a16:creationId xmlns:a16="http://schemas.microsoft.com/office/drawing/2014/main" id="{02CB9036-1C46-F9AB-46F6-8B92DE878EBA}"/>
-              </a:ext>
-            </a:extLst>
-          </p:cNvPr>
-          <p:cNvSpPr txBox="1"/>
-          <p:nvPr/>
-        </p:nvSpPr>
-        <p:spPr>
-          <a:xfrm>
-            <a:off x="8116945" y="2910898"/>
-            <a:ext cx="825248" cy="415498"/>
-          </a:xfrm>
-          <a:prstGeom prst="rect">
-            <a:avLst/>
-          </a:prstGeom>
-          <a:noFill/>
-        </p:spPr>
-        <p:txBody>
-          <a:bodyPr wrap="square" rtlCol="0">
-            <a:spAutoFit/>
-          </a:bodyPr>
-          <a:lstStyle/>
-          <a:p>
-            <a:pPr algn="ctr"/>
-            <a:r>
-              <a:rPr lang="en-US" sz="2100" b="1"/>
-              <a:t>Print</a:t>
+              <a:t>Project Overview Start to Finish</a:t>
             </a:r>
           </a:p>
         </p:txBody>
@@ -5845,7 +5697,7 @@
     </p:spTree>
     <p:extLst>
       <p:ext uri="{BB962C8B-B14F-4D97-AF65-F5344CB8AC3E}">
-        <p14:creationId xmlns:p14="http://schemas.microsoft.com/office/powerpoint/2010/main" val="2150938210"/>
+        <p14:creationId xmlns:p14="http://schemas.microsoft.com/office/powerpoint/2010/main" val="529853859"/>
       </p:ext>
     </p:extLst>
   </p:cSld>
@@ -5856,91 +5708,6 @@
 </file>
 
 <file path=ppt/slides/slide8.xml><?xml version="1.0" encoding="utf-8"?>
-<p:sld xmlns:a="http://schemas.openxmlformats.org/drawingml/2006/main" xmlns:r="http://schemas.openxmlformats.org/officeDocument/2006/relationships" xmlns:p="http://schemas.openxmlformats.org/presentationml/2006/main">
-  <p:cSld>
-    <p:spTree>
-      <p:nvGrpSpPr>
-        <p:cNvPr id="1" name="">
-          <a:extLst>
-            <a:ext uri="{FF2B5EF4-FFF2-40B4-BE49-F238E27FC236}">
-              <a16:creationId xmlns:a16="http://schemas.microsoft.com/office/drawing/2014/main" id="{CCF4A767-14F7-1718-A8CB-1CD04515230E}"/>
-            </a:ext>
-          </a:extLst>
-        </p:cNvPr>
-        <p:cNvGrpSpPr/>
-        <p:nvPr/>
-      </p:nvGrpSpPr>
-      <p:grpSpPr>
-        <a:xfrm>
-          <a:off x="0" y="0"/>
-          <a:ext cx="0" cy="0"/>
-          <a:chOff x="0" y="0"/>
-          <a:chExt cx="0" cy="0"/>
-        </a:xfrm>
-      </p:grpSpPr>
-      <p:pic>
-        <p:nvPicPr>
-          <p:cNvPr id="2" name="Picture 1">
-            <a:extLst>
-              <a:ext uri="{FF2B5EF4-FFF2-40B4-BE49-F238E27FC236}">
-                <a16:creationId xmlns:a16="http://schemas.microsoft.com/office/drawing/2014/main" id="{18854D8F-ADC6-7788-A390-72DF31DC63BD}"/>
-              </a:ext>
-            </a:extLst>
-          </p:cNvPr>
-          <p:cNvPicPr>
-            <a:picLocks noChangeAspect="1"/>
-          </p:cNvPicPr>
-          <p:nvPr/>
-        </p:nvPicPr>
-        <p:blipFill>
-          <a:blip r:embed="rId2">
-            <a:extLst>
-              <a:ext uri="{28A0092B-C50C-407E-A947-70E740481C1C}">
-                <a14:useLocalDpi xmlns:a14="http://schemas.microsoft.com/office/drawing/2010/main" val="0"/>
-              </a:ext>
-            </a:extLst>
-          </a:blip>
-          <a:srcRect l="8088" t="6029" b="13336"/>
-          <a:stretch/>
-        </p:blipFill>
-        <p:spPr>
-          <a:xfrm>
-            <a:off x="1937995" y="1968285"/>
-            <a:ext cx="5268009" cy="3181131"/>
-          </a:xfrm>
-          <a:prstGeom prst="roundRect">
-            <a:avLst>
-              <a:gd name="adj" fmla="val 9911"/>
-            </a:avLst>
-          </a:prstGeom>
-          <a:ln w="57150">
-            <a:solidFill>
-              <a:srgbClr val="83A83F"/>
-            </a:solidFill>
-          </a:ln>
-          <a:effectLst>
-            <a:outerShdw blurRad="50800" dist="38100" dir="5400000" algn="t" rotWithShape="0">
-              <a:prstClr val="black">
-                <a:alpha val="40000"/>
-              </a:prstClr>
-            </a:outerShdw>
-          </a:effectLst>
-        </p:spPr>
-      </p:pic>
-    </p:spTree>
-    <p:extLst>
-      <p:ext uri="{BB962C8B-B14F-4D97-AF65-F5344CB8AC3E}">
-        <p14:creationId xmlns:p14="http://schemas.microsoft.com/office/powerpoint/2010/main" val="1253248882"/>
-      </p:ext>
-    </p:extLst>
-  </p:cSld>
-  <p:clrMapOvr>
-    <a:masterClrMapping/>
-  </p:clrMapOvr>
-</p:sld>
-</file>
-
-<file path=ppt/slides/slide9.xml><?xml version="1.0" encoding="utf-8"?>
 <p:sld xmlns:a="http://schemas.openxmlformats.org/drawingml/2006/main" xmlns:r="http://schemas.openxmlformats.org/officeDocument/2006/relationships" xmlns:p="http://schemas.openxmlformats.org/presentationml/2006/main">
   <p:cSld>
     <p:spTree>

</xml_diff>